<commit_message>
calling it a platform
</commit_message>
<xml_diff>
--- a/api-days-australia-2024/img/platform-engineering.pptx
+++ b/api-days-australia-2024/img/platform-engineering.pptx
@@ -265,7 +265,7 @@
           <a:p>
             <a:fld id="{D256F4D8-ABCF-4D43-98D5-A7F42FF447A9}" type="datetimeFigureOut">
               <a:rPr lang="en-CH" smtClean="0"/>
-              <a:t>14.10.2024</a:t>
+              <a:t>15.10.2024</a:t>
             </a:fld>
             <a:endParaRPr lang="en-CH"/>
           </a:p>
@@ -465,7 +465,7 @@
           <a:p>
             <a:fld id="{D256F4D8-ABCF-4D43-98D5-A7F42FF447A9}" type="datetimeFigureOut">
               <a:rPr lang="en-CH" smtClean="0"/>
-              <a:t>14.10.2024</a:t>
+              <a:t>15.10.2024</a:t>
             </a:fld>
             <a:endParaRPr lang="en-CH"/>
           </a:p>
@@ -675,7 +675,7 @@
           <a:p>
             <a:fld id="{D256F4D8-ABCF-4D43-98D5-A7F42FF447A9}" type="datetimeFigureOut">
               <a:rPr lang="en-CH" smtClean="0"/>
-              <a:t>14.10.2024</a:t>
+              <a:t>15.10.2024</a:t>
             </a:fld>
             <a:endParaRPr lang="en-CH"/>
           </a:p>
@@ -875,7 +875,7 @@
           <a:p>
             <a:fld id="{D256F4D8-ABCF-4D43-98D5-A7F42FF447A9}" type="datetimeFigureOut">
               <a:rPr lang="en-CH" smtClean="0"/>
-              <a:t>14.10.2024</a:t>
+              <a:t>15.10.2024</a:t>
             </a:fld>
             <a:endParaRPr lang="en-CH"/>
           </a:p>
@@ -1151,7 +1151,7 @@
           <a:p>
             <a:fld id="{D256F4D8-ABCF-4D43-98D5-A7F42FF447A9}" type="datetimeFigureOut">
               <a:rPr lang="en-CH" smtClean="0"/>
-              <a:t>14.10.2024</a:t>
+              <a:t>15.10.2024</a:t>
             </a:fld>
             <a:endParaRPr lang="en-CH"/>
           </a:p>
@@ -1419,7 +1419,7 @@
           <a:p>
             <a:fld id="{D256F4D8-ABCF-4D43-98D5-A7F42FF447A9}" type="datetimeFigureOut">
               <a:rPr lang="en-CH" smtClean="0"/>
-              <a:t>14.10.2024</a:t>
+              <a:t>15.10.2024</a:t>
             </a:fld>
             <a:endParaRPr lang="en-CH"/>
           </a:p>
@@ -1834,7 +1834,7 @@
           <a:p>
             <a:fld id="{D256F4D8-ABCF-4D43-98D5-A7F42FF447A9}" type="datetimeFigureOut">
               <a:rPr lang="en-CH" smtClean="0"/>
-              <a:t>14.10.2024</a:t>
+              <a:t>15.10.2024</a:t>
             </a:fld>
             <a:endParaRPr lang="en-CH"/>
           </a:p>
@@ -1976,7 +1976,7 @@
           <a:p>
             <a:fld id="{D256F4D8-ABCF-4D43-98D5-A7F42FF447A9}" type="datetimeFigureOut">
               <a:rPr lang="en-CH" smtClean="0"/>
-              <a:t>14.10.2024</a:t>
+              <a:t>15.10.2024</a:t>
             </a:fld>
             <a:endParaRPr lang="en-CH"/>
           </a:p>
@@ -2089,7 +2089,7 @@
           <a:p>
             <a:fld id="{D256F4D8-ABCF-4D43-98D5-A7F42FF447A9}" type="datetimeFigureOut">
               <a:rPr lang="en-CH" smtClean="0"/>
-              <a:t>14.10.2024</a:t>
+              <a:t>15.10.2024</a:t>
             </a:fld>
             <a:endParaRPr lang="en-CH"/>
           </a:p>
@@ -2402,7 +2402,7 @@
           <a:p>
             <a:fld id="{D256F4D8-ABCF-4D43-98D5-A7F42FF447A9}" type="datetimeFigureOut">
               <a:rPr lang="en-CH" smtClean="0"/>
-              <a:t>14.10.2024</a:t>
+              <a:t>15.10.2024</a:t>
             </a:fld>
             <a:endParaRPr lang="en-CH"/>
           </a:p>
@@ -2691,7 +2691,7 @@
           <a:p>
             <a:fld id="{D256F4D8-ABCF-4D43-98D5-A7F42FF447A9}" type="datetimeFigureOut">
               <a:rPr lang="en-CH" smtClean="0"/>
-              <a:t>14.10.2024</a:t>
+              <a:t>15.10.2024</a:t>
             </a:fld>
             <a:endParaRPr lang="en-CH"/>
           </a:p>
@@ -2934,7 +2934,7 @@
           <a:p>
             <a:fld id="{D256F4D8-ABCF-4D43-98D5-A7F42FF447A9}" type="datetimeFigureOut">
               <a:rPr lang="en-CH" smtClean="0"/>
-              <a:t>14.10.2024</a:t>
+              <a:t>15.10.2024</a:t>
             </a:fld>
             <a:endParaRPr lang="en-CH"/>
           </a:p>
@@ -3415,6 +3415,19 @@
                 <a:latin typeface="Ford Antenna Medium" panose="02000505000000020004" pitchFamily="2" charset="0"/>
               </a:rPr>
               <a:t>                 Infrastructure</a:t>
+            </a:r>
+          </a:p>
+          <a:p>
+            <a:r>
+              <a:rPr lang="en-CH" sz="1600" dirty="0">
+                <a:solidFill>
+                  <a:schemeClr val="accent6">
+                    <a:lumMod val="50000"/>
+                  </a:schemeClr>
+                </a:solidFill>
+                <a:latin typeface="Ford Antenna Medium" panose="02000505000000020004" pitchFamily="2" charset="0"/>
+              </a:rPr>
+              <a:t>                      Platform</a:t>
             </a:r>
           </a:p>
         </p:txBody>

</xml_diff>